<commit_message>
Add files to the 20171124 LTCMeasurementActorToInterface directory. These were made long ago, and are not checked at this time...
</commit_message>
<xml_diff>
--- a/20171124-LTCMeasurementActorToInterface/Code Transformation.pptx
+++ b/20171124-LTCMeasurementActorToInterface/Code Transformation.pptx
@@ -5,7 +5,7 @@
     <p:sldMasterId id="2147483648" r:id="rId1"/>
   </p:sldMasterIdLst>
   <p:notesMasterIdLst>
-    <p:notesMasterId r:id="rId19"/>
+    <p:notesMasterId r:id="rId20"/>
   </p:notesMasterIdLst>
   <p:sldIdLst>
     <p:sldId id="256" r:id="rId2"/>
@@ -25,6 +25,7 @@
     <p:sldId id="270" r:id="rId16"/>
     <p:sldId id="271" r:id="rId17"/>
     <p:sldId id="272" r:id="rId18"/>
+    <p:sldId id="273" r:id="rId19"/>
   </p:sldIdLst>
   <p:sldSz cx="12192000" cy="6858000"/>
   <p:notesSz cx="6858000" cy="9144000"/>
@@ -143,20 +144,6 @@
 </p:cmAuthorLst>
 </file>
 
-<file path=ppt/comments/comment1.xml><?xml version="1.0" encoding="utf-8"?>
-<p:cmLst xmlns:a="http://schemas.openxmlformats.org/drawingml/2006/main" xmlns:r="http://schemas.openxmlformats.org/officeDocument/2006/relationships" xmlns:p="http://schemas.openxmlformats.org/presentationml/2006/main">
-  <p:cm authorId="1" dt="2017-11-22T11:07:24.278" idx="1">
-    <p:pos x="10" y="10"/>
-    <p:text/>
-    <p:extLst>
-      <p:ext uri="{C676402C-5697-4E1C-873F-D02D1690AC5C}">
-        <p15:threadingInfo xmlns:p15="http://schemas.microsoft.com/office/powerpoint/2012/main" timeZoneBias="-540"/>
-      </p:ext>
-    </p:extLst>
-  </p:cm>
-</p:cmLst>
-</file>
-
 <file path=ppt/notesMasters/notesMaster1.xml><?xml version="1.0" encoding="utf-8"?>
 <p:notesMaster xmlns:a="http://schemas.openxmlformats.org/drawingml/2006/main" xmlns:r="http://schemas.openxmlformats.org/officeDocument/2006/relationships" xmlns:p="http://schemas.openxmlformats.org/presentationml/2006/main">
   <p:cSld>
@@ -239,7 +226,7 @@
           <a:p>
             <a:fld id="{D0DC2661-1E35-4BBE-99BA-10783B25B9BB}" type="datetimeFigureOut">
               <a:rPr lang="en-GB" smtClean="0"/>
-              <a:t>22/11/2017</a:t>
+              <a:t>23/11/2017</a:t>
             </a:fld>
             <a:endParaRPr lang="en-GB"/>
           </a:p>
@@ -553,6 +540,218 @@
           <a:p>
             <a:r>
               <a:rPr lang="en-GB" dirty="0" smtClean="0"/>
+              <a:t>Next slide is the </a:t>
+            </a:r>
+            <a:r>
+              <a:rPr lang="en-GB" dirty="0" err="1" smtClean="0"/>
+              <a:t>subVI</a:t>
+            </a:r>
+            <a:r>
+              <a:rPr lang="en-GB" dirty="0" smtClean="0"/>
+              <a:t> in the upper right image.</a:t>
+            </a:r>
+          </a:p>
+          <a:p>
+            <a:r>
+              <a:rPr lang="en-GB" dirty="0" smtClean="0"/>
+              <a:t>Even though this is only a small part</a:t>
+            </a:r>
+            <a:r>
+              <a:rPr lang="en-GB" baseline="0" dirty="0" smtClean="0"/>
+              <a:t> of the system, already lots of hidden detail (multiple frames, states, </a:t>
+            </a:r>
+            <a:r>
+              <a:rPr lang="en-GB" baseline="0" dirty="0" err="1" smtClean="0"/>
+              <a:t>etc</a:t>
+            </a:r>
+            <a:r>
+              <a:rPr lang="en-GB" baseline="0" dirty="0" smtClean="0"/>
+              <a:t>)</a:t>
+            </a:r>
+            <a:endParaRPr lang="en-GB" dirty="0"/>
+          </a:p>
+        </p:txBody>
+      </p:sp>
+      <p:sp>
+        <p:nvSpPr>
+          <p:cNvPr id="4" name="Slide Number Placeholder 3"/>
+          <p:cNvSpPr>
+            <a:spLocks noGrp="1"/>
+          </p:cNvSpPr>
+          <p:nvPr>
+            <p:ph type="sldNum" sz="quarter" idx="10"/>
+          </p:nvPr>
+        </p:nvSpPr>
+        <p:spPr/>
+        <p:txBody>
+          <a:bodyPr/>
+          <a:lstStyle/>
+          <a:p>
+            <a:fld id="{1964D22C-D060-4B91-BDE4-7001F6F6BDFB}" type="slidenum">
+              <a:rPr lang="en-GB" smtClean="0"/>
+              <a:t>2</a:t>
+            </a:fld>
+            <a:endParaRPr lang="en-GB"/>
+          </a:p>
+        </p:txBody>
+      </p:sp>
+    </p:spTree>
+    <p:extLst>
+      <p:ext uri="{BB962C8B-B14F-4D97-AF65-F5344CB8AC3E}">
+        <p14:creationId xmlns:p14="http://schemas.microsoft.com/office/powerpoint/2010/main" val="1034551561"/>
+      </p:ext>
+    </p:extLst>
+  </p:cSld>
+  <p:clrMapOvr>
+    <a:masterClrMapping/>
+  </p:clrMapOvr>
+</p:notes>
+</file>
+
+<file path=ppt/notesSlides/notesSlide10.xml><?xml version="1.0" encoding="utf-8"?>
+<p:notes xmlns:a="http://schemas.openxmlformats.org/drawingml/2006/main" xmlns:r="http://schemas.openxmlformats.org/officeDocument/2006/relationships" xmlns:p="http://schemas.openxmlformats.org/presentationml/2006/main">
+  <p:cSld>
+    <p:spTree>
+      <p:nvGrpSpPr>
+        <p:cNvPr id="1" name=""/>
+        <p:cNvGrpSpPr/>
+        <p:nvPr/>
+      </p:nvGrpSpPr>
+      <p:grpSpPr>
+        <a:xfrm>
+          <a:off x="0" y="0"/>
+          <a:ext cx="0" cy="0"/>
+          <a:chOff x="0" y="0"/>
+          <a:chExt cx="0" cy="0"/>
+        </a:xfrm>
+      </p:grpSpPr>
+      <p:sp>
+        <p:nvSpPr>
+          <p:cNvPr id="2" name="Slide Image Placeholder 1"/>
+          <p:cNvSpPr>
+            <a:spLocks noGrp="1" noRot="1" noChangeAspect="1"/>
+          </p:cNvSpPr>
+          <p:nvPr>
+            <p:ph type="sldImg"/>
+          </p:nvPr>
+        </p:nvSpPr>
+        <p:spPr/>
+      </p:sp>
+      <p:sp>
+        <p:nvSpPr>
+          <p:cNvPr id="3" name="Notes Placeholder 2"/>
+          <p:cNvSpPr>
+            <a:spLocks noGrp="1"/>
+          </p:cNvSpPr>
+          <p:nvPr>
+            <p:ph type="body" idx="1"/>
+          </p:nvPr>
+        </p:nvSpPr>
+        <p:spPr/>
+        <p:txBody>
+          <a:bodyPr/>
+          <a:lstStyle/>
+          <a:p>
+            <a:r>
+              <a:rPr lang="en-GB" dirty="0" smtClean="0"/>
+              <a:t>The</a:t>
+            </a:r>
+            <a:r>
+              <a:rPr lang="en-GB" baseline="0" dirty="0" smtClean="0"/>
+              <a:t> API are the actions I believe any Measurement should be able to fulfil. </a:t>
+            </a:r>
+          </a:p>
+          <a:p>
+            <a:r>
+              <a:rPr lang="en-GB" baseline="0" dirty="0" smtClean="0"/>
+              <a:t>The Protected interface is the list of VIs, some of which are static dispatch, that can be used by children to help carry out those actions. These cannot be called from outside of the classes.</a:t>
+            </a:r>
+            <a:endParaRPr lang="en-GB" dirty="0"/>
+          </a:p>
+        </p:txBody>
+      </p:sp>
+      <p:sp>
+        <p:nvSpPr>
+          <p:cNvPr id="4" name="Slide Number Placeholder 3"/>
+          <p:cNvSpPr>
+            <a:spLocks noGrp="1"/>
+          </p:cNvSpPr>
+          <p:nvPr>
+            <p:ph type="sldNum" sz="quarter" idx="10"/>
+          </p:nvPr>
+        </p:nvSpPr>
+        <p:spPr/>
+        <p:txBody>
+          <a:bodyPr/>
+          <a:lstStyle/>
+          <a:p>
+            <a:fld id="{1964D22C-D060-4B91-BDE4-7001F6F6BDFB}" type="slidenum">
+              <a:rPr lang="en-GB" smtClean="0"/>
+              <a:t>11</a:t>
+            </a:fld>
+            <a:endParaRPr lang="en-GB"/>
+          </a:p>
+        </p:txBody>
+      </p:sp>
+    </p:spTree>
+    <p:extLst>
+      <p:ext uri="{BB962C8B-B14F-4D97-AF65-F5344CB8AC3E}">
+        <p14:creationId xmlns:p14="http://schemas.microsoft.com/office/powerpoint/2010/main" val="4094296069"/>
+      </p:ext>
+    </p:extLst>
+  </p:cSld>
+  <p:clrMapOvr>
+    <a:masterClrMapping/>
+  </p:clrMapOvr>
+</p:notes>
+</file>
+
+<file path=ppt/notesSlides/notesSlide11.xml><?xml version="1.0" encoding="utf-8"?>
+<p:notes xmlns:a="http://schemas.openxmlformats.org/drawingml/2006/main" xmlns:r="http://schemas.openxmlformats.org/officeDocument/2006/relationships" xmlns:p="http://schemas.openxmlformats.org/presentationml/2006/main">
+  <p:cSld>
+    <p:spTree>
+      <p:nvGrpSpPr>
+        <p:cNvPr id="1" name=""/>
+        <p:cNvGrpSpPr/>
+        <p:nvPr/>
+      </p:nvGrpSpPr>
+      <p:grpSpPr>
+        <a:xfrm>
+          <a:off x="0" y="0"/>
+          <a:ext cx="0" cy="0"/>
+          <a:chOff x="0" y="0"/>
+          <a:chExt cx="0" cy="0"/>
+        </a:xfrm>
+      </p:grpSpPr>
+      <p:sp>
+        <p:nvSpPr>
+          <p:cNvPr id="2" name="Slide Image Placeholder 1"/>
+          <p:cNvSpPr>
+            <a:spLocks noGrp="1" noRot="1" noChangeAspect="1"/>
+          </p:cNvSpPr>
+          <p:nvPr>
+            <p:ph type="sldImg"/>
+          </p:nvPr>
+        </p:nvSpPr>
+        <p:spPr/>
+      </p:sp>
+      <p:sp>
+        <p:nvSpPr>
+          <p:cNvPr id="3" name="Notes Placeholder 2"/>
+          <p:cNvSpPr>
+            <a:spLocks noGrp="1"/>
+          </p:cNvSpPr>
+          <p:nvPr>
+            <p:ph type="body" idx="1"/>
+          </p:nvPr>
+        </p:nvSpPr>
+        <p:spPr/>
+        <p:txBody>
+          <a:bodyPr/>
+          <a:lstStyle/>
+          <a:p>
+            <a:r>
+              <a:rPr lang="en-GB" dirty="0" smtClean="0"/>
               <a:t>Describe the purpose of Stop Core and Actor Core, and the flow of the Actor Framework at a high level (</a:t>
             </a:r>
             <a:r>
@@ -566,6 +765,20 @@
             <a:r>
               <a:rPr lang="en-GB" baseline="0" dirty="0" smtClean="0"/>
               <a:t> AC, SC)</a:t>
+            </a:r>
+          </a:p>
+          <a:p>
+            <a:r>
+              <a:rPr lang="en-GB" baseline="0" dirty="0" smtClean="0"/>
+              <a:t>Can start from “</a:t>
+            </a:r>
+            <a:r>
+              <a:rPr lang="en-GB" baseline="0" dirty="0" err="1" smtClean="0"/>
+              <a:t>workingLTC-rewriteAsMeasurement</a:t>
+            </a:r>
+            <a:r>
+              <a:rPr lang="en-GB" baseline="0" dirty="0" smtClean="0"/>
+              <a:t>” and finish this slide at “p0” tags.</a:t>
             </a:r>
             <a:endParaRPr lang="en-GB" dirty="0"/>
           </a:p>
@@ -598,6 +811,608 @@
     <p:extLst>
       <p:ext uri="{BB962C8B-B14F-4D97-AF65-F5344CB8AC3E}">
         <p14:creationId xmlns:p14="http://schemas.microsoft.com/office/powerpoint/2010/main" val="1906087369"/>
+      </p:ext>
+    </p:extLst>
+  </p:cSld>
+  <p:clrMapOvr>
+    <a:masterClrMapping/>
+  </p:clrMapOvr>
+</p:notes>
+</file>
+
+<file path=ppt/notesSlides/notesSlide12.xml><?xml version="1.0" encoding="utf-8"?>
+<p:notes xmlns:a="http://schemas.openxmlformats.org/drawingml/2006/main" xmlns:r="http://schemas.openxmlformats.org/officeDocument/2006/relationships" xmlns:p="http://schemas.openxmlformats.org/presentationml/2006/main">
+  <p:cSld>
+    <p:spTree>
+      <p:nvGrpSpPr>
+        <p:cNvPr id="1" name=""/>
+        <p:cNvGrpSpPr/>
+        <p:nvPr/>
+      </p:nvGrpSpPr>
+      <p:grpSpPr>
+        <a:xfrm>
+          <a:off x="0" y="0"/>
+          <a:ext cx="0" cy="0"/>
+          <a:chOff x="0" y="0"/>
+          <a:chExt cx="0" cy="0"/>
+        </a:xfrm>
+      </p:grpSpPr>
+      <p:sp>
+        <p:nvSpPr>
+          <p:cNvPr id="2" name="Slide Image Placeholder 1"/>
+          <p:cNvSpPr>
+            <a:spLocks noGrp="1" noRot="1" noChangeAspect="1"/>
+          </p:cNvSpPr>
+          <p:nvPr>
+            <p:ph type="sldImg"/>
+          </p:nvPr>
+        </p:nvSpPr>
+        <p:spPr/>
+      </p:sp>
+      <p:sp>
+        <p:nvSpPr>
+          <p:cNvPr id="3" name="Notes Placeholder 2"/>
+          <p:cNvSpPr>
+            <a:spLocks noGrp="1"/>
+          </p:cNvSpPr>
+          <p:nvPr>
+            <p:ph type="body" idx="1"/>
+          </p:nvPr>
+        </p:nvSpPr>
+        <p:spPr/>
+        <p:txBody>
+          <a:bodyPr/>
+          <a:lstStyle/>
+          <a:p>
+            <a:r>
+              <a:rPr lang="en-GB" smtClean="0"/>
+              <a:t>Before –</a:t>
+            </a:r>
+            <a:r>
+              <a:rPr lang="en-GB" baseline="0" smtClean="0"/>
+              <a:t> the Actor Core VI</a:t>
+            </a:r>
+            <a:endParaRPr lang="en-GB"/>
+          </a:p>
+        </p:txBody>
+      </p:sp>
+      <p:sp>
+        <p:nvSpPr>
+          <p:cNvPr id="4" name="Slide Number Placeholder 3"/>
+          <p:cNvSpPr>
+            <a:spLocks noGrp="1"/>
+          </p:cNvSpPr>
+          <p:nvPr>
+            <p:ph type="sldNum" sz="quarter" idx="10"/>
+          </p:nvPr>
+        </p:nvSpPr>
+        <p:spPr/>
+        <p:txBody>
+          <a:bodyPr/>
+          <a:lstStyle/>
+          <a:p>
+            <a:fld id="{1964D22C-D060-4B91-BDE4-7001F6F6BDFB}" type="slidenum">
+              <a:rPr lang="en-GB" smtClean="0"/>
+              <a:t>13</a:t>
+            </a:fld>
+            <a:endParaRPr lang="en-GB"/>
+          </a:p>
+        </p:txBody>
+      </p:sp>
+    </p:spTree>
+    <p:extLst>
+      <p:ext uri="{BB962C8B-B14F-4D97-AF65-F5344CB8AC3E}">
+        <p14:creationId xmlns:p14="http://schemas.microsoft.com/office/powerpoint/2010/main" val="2165812019"/>
+      </p:ext>
+    </p:extLst>
+  </p:cSld>
+  <p:clrMapOvr>
+    <a:masterClrMapping/>
+  </p:clrMapOvr>
+</p:notes>
+</file>
+
+<file path=ppt/notesSlides/notesSlide13.xml><?xml version="1.0" encoding="utf-8"?>
+<p:notes xmlns:a="http://schemas.openxmlformats.org/drawingml/2006/main" xmlns:r="http://schemas.openxmlformats.org/officeDocument/2006/relationships" xmlns:p="http://schemas.openxmlformats.org/presentationml/2006/main">
+  <p:cSld>
+    <p:spTree>
+      <p:nvGrpSpPr>
+        <p:cNvPr id="1" name=""/>
+        <p:cNvGrpSpPr/>
+        <p:nvPr/>
+      </p:nvGrpSpPr>
+      <p:grpSpPr>
+        <a:xfrm>
+          <a:off x="0" y="0"/>
+          <a:ext cx="0" cy="0"/>
+          <a:chOff x="0" y="0"/>
+          <a:chExt cx="0" cy="0"/>
+        </a:xfrm>
+      </p:grpSpPr>
+      <p:sp>
+        <p:nvSpPr>
+          <p:cNvPr id="2" name="Slide Image Placeholder 1"/>
+          <p:cNvSpPr>
+            <a:spLocks noGrp="1" noRot="1" noChangeAspect="1"/>
+          </p:cNvSpPr>
+          <p:nvPr>
+            <p:ph type="sldImg"/>
+          </p:nvPr>
+        </p:nvSpPr>
+        <p:spPr/>
+      </p:sp>
+      <p:sp>
+        <p:nvSpPr>
+          <p:cNvPr id="3" name="Notes Placeholder 2"/>
+          <p:cNvSpPr>
+            <a:spLocks noGrp="1"/>
+          </p:cNvSpPr>
+          <p:nvPr>
+            <p:ph type="body" idx="1"/>
+          </p:nvPr>
+        </p:nvSpPr>
+        <p:spPr/>
+        <p:txBody>
+          <a:bodyPr/>
+          <a:lstStyle/>
+          <a:p>
+            <a:r>
+              <a:rPr lang="en-GB" dirty="0" smtClean="0"/>
+              <a:t>Just</a:t>
+            </a:r>
+            <a:r>
+              <a:rPr lang="en-GB" baseline="0" dirty="0" smtClean="0"/>
+              <a:t> copied the code from Actor Core into Reserve (created via From Override) and then placed this in the Actor Core.</a:t>
+            </a:r>
+          </a:p>
+          <a:p>
+            <a:r>
+              <a:rPr lang="en-GB" baseline="0" dirty="0" smtClean="0"/>
+              <a:t>In this way, it’s only using it as a simple </a:t>
+            </a:r>
+            <a:r>
+              <a:rPr lang="en-GB" baseline="0" dirty="0" err="1" smtClean="0"/>
+              <a:t>SubVI</a:t>
+            </a:r>
+            <a:r>
+              <a:rPr lang="en-GB" baseline="0" dirty="0" smtClean="0"/>
+              <a:t> – done to preserve behaviour.</a:t>
+            </a:r>
+          </a:p>
+          <a:p>
+            <a:r>
+              <a:rPr lang="en-GB" baseline="0" dirty="0" smtClean="0"/>
+              <a:t>In future, this can be removed once the VI is called via a hierarchy to make it behave like a Measurement Actor.</a:t>
+            </a:r>
+          </a:p>
+          <a:p>
+            <a:r>
+              <a:rPr lang="en-GB" baseline="0" dirty="0" smtClean="0"/>
+              <a:t>There’s an error here – should remove the errors afterwards, or else “Reserved?” will be set to true in the parent unconditionally</a:t>
+            </a:r>
+            <a:r>
+              <a:rPr lang="en-GB" baseline="0" dirty="0" smtClean="0"/>
+              <a:t>!</a:t>
+            </a:r>
+          </a:p>
+          <a:p>
+            <a:r>
+              <a:rPr lang="en-GB" baseline="0" dirty="0" smtClean="0"/>
+              <a:t>Discuss how the functionality in the parent implementation can make it harder to write the child correctly.</a:t>
+            </a:r>
+          </a:p>
+          <a:p>
+            <a:endParaRPr lang="en-GB" dirty="0"/>
+          </a:p>
+        </p:txBody>
+      </p:sp>
+      <p:sp>
+        <p:nvSpPr>
+          <p:cNvPr id="4" name="Slide Number Placeholder 3"/>
+          <p:cNvSpPr>
+            <a:spLocks noGrp="1"/>
+          </p:cNvSpPr>
+          <p:nvPr>
+            <p:ph type="sldNum" sz="quarter" idx="10"/>
+          </p:nvPr>
+        </p:nvSpPr>
+        <p:spPr/>
+        <p:txBody>
+          <a:bodyPr/>
+          <a:lstStyle/>
+          <a:p>
+            <a:fld id="{1964D22C-D060-4B91-BDE4-7001F6F6BDFB}" type="slidenum">
+              <a:rPr lang="en-GB" smtClean="0"/>
+              <a:t>14</a:t>
+            </a:fld>
+            <a:endParaRPr lang="en-GB"/>
+          </a:p>
+        </p:txBody>
+      </p:sp>
+    </p:spTree>
+    <p:extLst>
+      <p:ext uri="{BB962C8B-B14F-4D97-AF65-F5344CB8AC3E}">
+        <p14:creationId xmlns:p14="http://schemas.microsoft.com/office/powerpoint/2010/main" val="1197345785"/>
+      </p:ext>
+    </p:extLst>
+  </p:cSld>
+  <p:clrMapOvr>
+    <a:masterClrMapping/>
+  </p:clrMapOvr>
+</p:notes>
+</file>
+
+<file path=ppt/notesSlides/notesSlide14.xml><?xml version="1.0" encoding="utf-8"?>
+<p:notes xmlns:a="http://schemas.openxmlformats.org/drawingml/2006/main" xmlns:r="http://schemas.openxmlformats.org/officeDocument/2006/relationships" xmlns:p="http://schemas.openxmlformats.org/presentationml/2006/main">
+  <p:cSld>
+    <p:spTree>
+      <p:nvGrpSpPr>
+        <p:cNvPr id="1" name=""/>
+        <p:cNvGrpSpPr/>
+        <p:nvPr/>
+      </p:nvGrpSpPr>
+      <p:grpSpPr>
+        <a:xfrm>
+          <a:off x="0" y="0"/>
+          <a:ext cx="0" cy="0"/>
+          <a:chOff x="0" y="0"/>
+          <a:chExt cx="0" cy="0"/>
+        </a:xfrm>
+      </p:grpSpPr>
+      <p:sp>
+        <p:nvSpPr>
+          <p:cNvPr id="2" name="Slide Image Placeholder 1"/>
+          <p:cNvSpPr>
+            <a:spLocks noGrp="1" noRot="1" noChangeAspect="1"/>
+          </p:cNvSpPr>
+          <p:nvPr>
+            <p:ph type="sldImg"/>
+          </p:nvPr>
+        </p:nvSpPr>
+        <p:spPr/>
+      </p:sp>
+      <p:sp>
+        <p:nvSpPr>
+          <p:cNvPr id="3" name="Notes Placeholder 2"/>
+          <p:cNvSpPr>
+            <a:spLocks noGrp="1"/>
+          </p:cNvSpPr>
+          <p:nvPr>
+            <p:ph type="body" idx="1"/>
+          </p:nvPr>
+        </p:nvSpPr>
+        <p:spPr/>
+        <p:txBody>
+          <a:bodyPr/>
+          <a:lstStyle/>
+          <a:p>
+            <a:r>
+              <a:rPr lang="en-GB" dirty="0" err="1" smtClean="0"/>
+              <a:t>SingleMeasurement</a:t>
+            </a:r>
+            <a:r>
+              <a:rPr lang="en-GB" dirty="0" smtClean="0"/>
+              <a:t> should</a:t>
+            </a:r>
+            <a:r>
+              <a:rPr lang="en-GB" baseline="0" dirty="0" smtClean="0"/>
+              <a:t> make a measurement, record the time, and send a Measurement Result object with all the relevant information to the Distributor.</a:t>
+            </a:r>
+          </a:p>
+          <a:p>
+            <a:r>
+              <a:rPr lang="en-GB" baseline="0" dirty="0" smtClean="0"/>
+              <a:t>In the starting case, I want to make it behave exactly like it does now!</a:t>
+            </a:r>
+          </a:p>
+          <a:p>
+            <a:r>
+              <a:rPr lang="en-GB" baseline="0" dirty="0" smtClean="0"/>
+              <a:t>First, we’ll get rid of the For loop in the middle – this is not relevant to the normal operation and is a lower level construct (like the error codes)</a:t>
+            </a:r>
+          </a:p>
+          <a:p>
+            <a:r>
+              <a:rPr lang="en-GB" baseline="0" dirty="0" smtClean="0"/>
+              <a:t>Work through in LabVIEW: start with MeasureTemperature_old.vi and try create a </a:t>
+            </a:r>
+            <a:r>
+              <a:rPr lang="en-GB" baseline="0" dirty="0" err="1" smtClean="0"/>
+              <a:t>subVI</a:t>
+            </a:r>
+            <a:r>
+              <a:rPr lang="en-GB" baseline="0" dirty="0" smtClean="0"/>
+              <a:t>. Note the large number of inputs, and how they’re all available via the class.</a:t>
+            </a:r>
+          </a:p>
+          <a:p>
+            <a:endParaRPr lang="en-GB" dirty="0"/>
+          </a:p>
+        </p:txBody>
+      </p:sp>
+      <p:sp>
+        <p:nvSpPr>
+          <p:cNvPr id="4" name="Slide Number Placeholder 3"/>
+          <p:cNvSpPr>
+            <a:spLocks noGrp="1"/>
+          </p:cNvSpPr>
+          <p:nvPr>
+            <p:ph type="sldNum" sz="quarter" idx="10"/>
+          </p:nvPr>
+        </p:nvSpPr>
+        <p:spPr/>
+        <p:txBody>
+          <a:bodyPr/>
+          <a:lstStyle/>
+          <a:p>
+            <a:fld id="{1964D22C-D060-4B91-BDE4-7001F6F6BDFB}" type="slidenum">
+              <a:rPr lang="en-GB" smtClean="0"/>
+              <a:t>15</a:t>
+            </a:fld>
+            <a:endParaRPr lang="en-GB"/>
+          </a:p>
+        </p:txBody>
+      </p:sp>
+    </p:spTree>
+    <p:extLst>
+      <p:ext uri="{BB962C8B-B14F-4D97-AF65-F5344CB8AC3E}">
+        <p14:creationId xmlns:p14="http://schemas.microsoft.com/office/powerpoint/2010/main" val="3423329383"/>
+      </p:ext>
+    </p:extLst>
+  </p:cSld>
+  <p:clrMapOvr>
+    <a:masterClrMapping/>
+  </p:clrMapOvr>
+</p:notes>
+</file>
+
+<file path=ppt/notesSlides/notesSlide15.xml><?xml version="1.0" encoding="utf-8"?>
+<p:notes xmlns:a="http://schemas.openxmlformats.org/drawingml/2006/main" xmlns:r="http://schemas.openxmlformats.org/officeDocument/2006/relationships" xmlns:p="http://schemas.openxmlformats.org/presentationml/2006/main">
+  <p:cSld>
+    <p:spTree>
+      <p:nvGrpSpPr>
+        <p:cNvPr id="1" name=""/>
+        <p:cNvGrpSpPr/>
+        <p:nvPr/>
+      </p:nvGrpSpPr>
+      <p:grpSpPr>
+        <a:xfrm>
+          <a:off x="0" y="0"/>
+          <a:ext cx="0" cy="0"/>
+          <a:chOff x="0" y="0"/>
+          <a:chExt cx="0" cy="0"/>
+        </a:xfrm>
+      </p:grpSpPr>
+      <p:sp>
+        <p:nvSpPr>
+          <p:cNvPr id="2" name="Slide Image Placeholder 1"/>
+          <p:cNvSpPr>
+            <a:spLocks noGrp="1" noRot="1" noChangeAspect="1"/>
+          </p:cNvSpPr>
+          <p:nvPr>
+            <p:ph type="sldImg"/>
+          </p:nvPr>
+        </p:nvSpPr>
+        <p:spPr/>
+      </p:sp>
+      <p:sp>
+        <p:nvSpPr>
+          <p:cNvPr id="3" name="Notes Placeholder 2"/>
+          <p:cNvSpPr>
+            <a:spLocks noGrp="1"/>
+          </p:cNvSpPr>
+          <p:nvPr>
+            <p:ph type="body" idx="1"/>
+          </p:nvPr>
+        </p:nvSpPr>
+        <p:spPr/>
+        <p:txBody>
+          <a:bodyPr/>
+          <a:lstStyle/>
+          <a:p>
+            <a:r>
+              <a:rPr lang="en-GB" dirty="0" smtClean="0"/>
+              <a:t>Some of these are not</a:t>
+            </a:r>
+            <a:r>
+              <a:rPr lang="en-GB" baseline="0" dirty="0" smtClean="0"/>
+              <a:t> inherently unreasonable – maybe directly coupling to the Error Handler is OK.</a:t>
+            </a:r>
+          </a:p>
+          <a:p>
+            <a:r>
+              <a:rPr lang="en-GB" baseline="0" dirty="0" smtClean="0"/>
+              <a:t>Some are ridiculous! How does LTC depend on a global VI in a different call chain, or </a:t>
+            </a:r>
+            <a:r>
+              <a:rPr lang="en-GB" baseline="0" dirty="0" err="1" smtClean="0"/>
+              <a:t>SimulatedData</a:t>
+            </a:r>
+            <a:r>
+              <a:rPr lang="en-GB" baseline="0" dirty="0" smtClean="0"/>
+              <a:t>/</a:t>
+            </a:r>
+            <a:r>
+              <a:rPr lang="en-GB" baseline="0" dirty="0" err="1" smtClean="0"/>
+              <a:t>CoolingUnitActor</a:t>
+            </a:r>
+            <a:r>
+              <a:rPr lang="en-GB" baseline="0" dirty="0" smtClean="0"/>
+              <a:t> (answer, probably a shared </a:t>
+            </a:r>
+            <a:r>
+              <a:rPr lang="en-GB" baseline="0" dirty="0" err="1" smtClean="0"/>
+              <a:t>typedef</a:t>
+            </a:r>
+            <a:r>
+              <a:rPr lang="en-GB" baseline="0" dirty="0" smtClean="0"/>
+              <a:t>!)</a:t>
+            </a:r>
+          </a:p>
+          <a:p>
+            <a:r>
+              <a:rPr lang="en-GB" baseline="0" dirty="0" smtClean="0"/>
+              <a:t>Reducing coupling will improve load times and improve chances of reuse elsewhere (example, a different experiment using the same hardware for this, but changing other parts).</a:t>
+            </a:r>
+            <a:endParaRPr lang="en-GB" dirty="0"/>
+          </a:p>
+        </p:txBody>
+      </p:sp>
+      <p:sp>
+        <p:nvSpPr>
+          <p:cNvPr id="4" name="Slide Number Placeholder 3"/>
+          <p:cNvSpPr>
+            <a:spLocks noGrp="1"/>
+          </p:cNvSpPr>
+          <p:nvPr>
+            <p:ph type="sldNum" sz="quarter" idx="10"/>
+          </p:nvPr>
+        </p:nvSpPr>
+        <p:spPr/>
+        <p:txBody>
+          <a:bodyPr/>
+          <a:lstStyle/>
+          <a:p>
+            <a:fld id="{1964D22C-D060-4B91-BDE4-7001F6F6BDFB}" type="slidenum">
+              <a:rPr lang="en-GB" smtClean="0"/>
+              <a:t>16</a:t>
+            </a:fld>
+            <a:endParaRPr lang="en-GB"/>
+          </a:p>
+        </p:txBody>
+      </p:sp>
+    </p:spTree>
+    <p:extLst>
+      <p:ext uri="{BB962C8B-B14F-4D97-AF65-F5344CB8AC3E}">
+        <p14:creationId xmlns:p14="http://schemas.microsoft.com/office/powerpoint/2010/main" val="554239013"/>
+      </p:ext>
+    </p:extLst>
+  </p:cSld>
+  <p:clrMapOvr>
+    <a:masterClrMapping/>
+  </p:clrMapOvr>
+</p:notes>
+</file>
+
+<file path=ppt/notesSlides/notesSlide16.xml><?xml version="1.0" encoding="utf-8"?>
+<p:notes xmlns:a="http://schemas.openxmlformats.org/drawingml/2006/main" xmlns:r="http://schemas.openxmlformats.org/officeDocument/2006/relationships" xmlns:p="http://schemas.openxmlformats.org/presentationml/2006/main">
+  <p:cSld>
+    <p:spTree>
+      <p:nvGrpSpPr>
+        <p:cNvPr id="1" name=""/>
+        <p:cNvGrpSpPr/>
+        <p:nvPr/>
+      </p:nvGrpSpPr>
+      <p:grpSpPr>
+        <a:xfrm>
+          <a:off x="0" y="0"/>
+          <a:ext cx="0" cy="0"/>
+          <a:chOff x="0" y="0"/>
+          <a:chExt cx="0" cy="0"/>
+        </a:xfrm>
+      </p:grpSpPr>
+      <p:sp>
+        <p:nvSpPr>
+          <p:cNvPr id="2" name="Slide Image Placeholder 1"/>
+          <p:cNvSpPr>
+            <a:spLocks noGrp="1" noRot="1" noChangeAspect="1"/>
+          </p:cNvSpPr>
+          <p:nvPr>
+            <p:ph type="sldImg"/>
+          </p:nvPr>
+        </p:nvSpPr>
+        <p:spPr/>
+      </p:sp>
+      <p:sp>
+        <p:nvSpPr>
+          <p:cNvPr id="3" name="Notes Placeholder 2"/>
+          <p:cNvSpPr>
+            <a:spLocks noGrp="1"/>
+          </p:cNvSpPr>
+          <p:nvPr>
+            <p:ph type="body" idx="1"/>
+          </p:nvPr>
+        </p:nvSpPr>
+        <p:spPr/>
+        <p:txBody>
+          <a:bodyPr/>
+          <a:lstStyle/>
+          <a:p>
+            <a:r>
+              <a:rPr lang="en-GB" dirty="0" smtClean="0"/>
+              <a:t>Some of these are not</a:t>
+            </a:r>
+            <a:r>
+              <a:rPr lang="en-GB" baseline="0" dirty="0" smtClean="0"/>
+              <a:t> inherently unreasonable – maybe directly coupling to the Error Handler is OK.</a:t>
+            </a:r>
+          </a:p>
+          <a:p>
+            <a:r>
+              <a:rPr lang="en-GB" baseline="0" dirty="0" smtClean="0"/>
+              <a:t>Some are ridiculous! How does LTC depend on a global VI in a different call chain, or </a:t>
+            </a:r>
+            <a:r>
+              <a:rPr lang="en-GB" baseline="0" dirty="0" err="1" smtClean="0"/>
+              <a:t>SimulatedData</a:t>
+            </a:r>
+            <a:r>
+              <a:rPr lang="en-GB" baseline="0" dirty="0" smtClean="0"/>
+              <a:t>/</a:t>
+            </a:r>
+            <a:r>
+              <a:rPr lang="en-GB" baseline="0" dirty="0" err="1" smtClean="0"/>
+              <a:t>CoolingUnitActor</a:t>
+            </a:r>
+            <a:r>
+              <a:rPr lang="en-GB" baseline="0" dirty="0" smtClean="0"/>
+              <a:t> (answer, probably a shared </a:t>
+            </a:r>
+            <a:r>
+              <a:rPr lang="en-GB" baseline="0" dirty="0" err="1" smtClean="0"/>
+              <a:t>typedef</a:t>
+            </a:r>
+            <a:r>
+              <a:rPr lang="en-GB" baseline="0" dirty="0" smtClean="0"/>
+              <a:t>!)</a:t>
+            </a:r>
+          </a:p>
+          <a:p>
+            <a:r>
+              <a:rPr lang="en-GB" baseline="0" dirty="0" smtClean="0"/>
+              <a:t>Reducing coupling will improve load times and improve chances of reuse elsewhere (example, a different experiment using the same hardware for this, but changing other parts).</a:t>
+            </a:r>
+            <a:endParaRPr lang="en-GB" dirty="0"/>
+          </a:p>
+        </p:txBody>
+      </p:sp>
+      <p:sp>
+        <p:nvSpPr>
+          <p:cNvPr id="4" name="Slide Number Placeholder 3"/>
+          <p:cNvSpPr>
+            <a:spLocks noGrp="1"/>
+          </p:cNvSpPr>
+          <p:nvPr>
+            <p:ph type="sldNum" sz="quarter" idx="10"/>
+          </p:nvPr>
+        </p:nvSpPr>
+        <p:spPr/>
+        <p:txBody>
+          <a:bodyPr/>
+          <a:lstStyle/>
+          <a:p>
+            <a:fld id="{1964D22C-D060-4B91-BDE4-7001F6F6BDFB}" type="slidenum">
+              <a:rPr lang="en-GB" smtClean="0"/>
+              <a:t>17</a:t>
+            </a:fld>
+            <a:endParaRPr lang="en-GB"/>
+          </a:p>
+        </p:txBody>
+      </p:sp>
+    </p:spTree>
+    <p:extLst>
+      <p:ext uri="{BB962C8B-B14F-4D97-AF65-F5344CB8AC3E}">
+        <p14:creationId xmlns:p14="http://schemas.microsoft.com/office/powerpoint/2010/main" val="3045378953"/>
       </p:ext>
     </p:extLst>
   </p:cSld>
@@ -652,14 +1467,13 @@
           <a:lstStyle/>
           <a:p>
             <a:r>
-              <a:rPr lang="en-GB" smtClean="0"/>
-              <a:t>Before –</a:t>
-            </a:r>
-            <a:r>
-              <a:rPr lang="en-GB" baseline="0" smtClean="0"/>
-              <a:t> the Actor Core VI</a:t>
-            </a:r>
-            <a:endParaRPr lang="en-GB"/>
+              <a:rPr lang="en-GB" dirty="0" smtClean="0"/>
+              <a:t>Calls</a:t>
+            </a:r>
+            <a:r>
+              <a:rPr lang="en-GB" baseline="0" dirty="0" smtClean="0"/>
+              <a:t> the VI asynchronously – this is something that is more easily provided by the Actor Framework (to be discussed)</a:t>
+            </a:r>
           </a:p>
         </p:txBody>
       </p:sp>
@@ -680,7 +1494,7 @@
           <a:p>
             <a:fld id="{1964D22C-D060-4B91-BDE4-7001F6F6BDFB}" type="slidenum">
               <a:rPr lang="en-GB" smtClean="0"/>
-              <a:t>13</a:t>
+              <a:t>3</a:t>
             </a:fld>
             <a:endParaRPr lang="en-GB"/>
           </a:p>
@@ -689,7 +1503,7 @@
     </p:spTree>
     <p:extLst>
       <p:ext uri="{BB962C8B-B14F-4D97-AF65-F5344CB8AC3E}">
-        <p14:creationId xmlns:p14="http://schemas.microsoft.com/office/powerpoint/2010/main" val="2165812019"/>
+        <p14:creationId xmlns:p14="http://schemas.microsoft.com/office/powerpoint/2010/main" val="4062579893"/>
       </p:ext>
     </p:extLst>
   </p:cSld>
@@ -745,39 +1559,18 @@
           <a:p>
             <a:r>
               <a:rPr lang="en-GB" dirty="0" smtClean="0"/>
-              <a:t>Just</a:t>
+              <a:t>This is the VI being called asynchronously.</a:t>
             </a:r>
             <a:r>
               <a:rPr lang="en-GB" baseline="0" dirty="0" smtClean="0"/>
-              <a:t> copied the code from Actor Core into Reserve (created via From Override) and then placed this in the Actor Core.</a:t>
+              <a:t> The three sections are an event handler (for the front panel events, and the queue driven events), an command handler in the centre, and the graph display at the bottom.</a:t>
             </a:r>
           </a:p>
           <a:p>
             <a:r>
               <a:rPr lang="en-GB" baseline="0" dirty="0" smtClean="0"/>
-              <a:t>In this way, it’s only using it as a simple </a:t>
-            </a:r>
-            <a:r>
-              <a:rPr lang="en-GB" baseline="0" dirty="0" err="1" smtClean="0"/>
-              <a:t>SubVI</a:t>
-            </a:r>
-            <a:r>
-              <a:rPr lang="en-GB" baseline="0" dirty="0" smtClean="0"/>
-              <a:t> – done to preserve behaviour.</a:t>
-            </a:r>
-          </a:p>
-          <a:p>
-            <a:r>
-              <a:rPr lang="en-GB" baseline="0" dirty="0" smtClean="0"/>
-              <a:t>In future, this can be removed once the VI is called via a hierarchy to make it behave like a Measurement Actor.</a:t>
-            </a:r>
-          </a:p>
-          <a:p>
-            <a:r>
-              <a:rPr lang="en-GB" baseline="0" dirty="0" smtClean="0"/>
-              <a:t>There’s an error here – should remove the errors afterwards, or else “Reserved?” will be set to true in the parent unconditionally!</a:t>
-            </a:r>
-            <a:endParaRPr lang="en-GB" dirty="0"/>
+              <a:t>In a way that will become common as a theme through this presentation, the important bit is easily missed because the VI gives much more space to side-activities… Try to emphasise the purpose in each VI (or at least, minimize distractions).</a:t>
+            </a:r>
           </a:p>
         </p:txBody>
       </p:sp>
@@ -798,7 +1591,7 @@
           <a:p>
             <a:fld id="{1964D22C-D060-4B91-BDE4-7001F6F6BDFB}" type="slidenum">
               <a:rPr lang="en-GB" smtClean="0"/>
-              <a:t>14</a:t>
+              <a:t>4</a:t>
             </a:fld>
             <a:endParaRPr lang="en-GB"/>
           </a:p>
@@ -807,7 +1600,7 @@
     </p:spTree>
     <p:extLst>
       <p:ext uri="{BB962C8B-B14F-4D97-AF65-F5344CB8AC3E}">
-        <p14:creationId xmlns:p14="http://schemas.microsoft.com/office/powerpoint/2010/main" val="1197345785"/>
+        <p14:creationId xmlns:p14="http://schemas.microsoft.com/office/powerpoint/2010/main" val="1702631188"/>
       </p:ext>
     </p:extLst>
   </p:cSld>
@@ -862,45 +1655,17 @@
           <a:lstStyle/>
           <a:p>
             <a:r>
+              <a:rPr lang="en-GB" dirty="0" smtClean="0"/>
+              <a:t>These next slides are the output from the “Print” command used on the main </a:t>
+            </a:r>
+            <a:r>
               <a:rPr lang="en-GB" dirty="0" err="1" smtClean="0"/>
-              <a:t>SingleMeasurement</a:t>
+              <a:t>subVI</a:t>
             </a:r>
             <a:r>
               <a:rPr lang="en-GB" dirty="0" smtClean="0"/>
-              <a:t> should</a:t>
-            </a:r>
-            <a:r>
-              <a:rPr lang="en-GB" baseline="0" dirty="0" smtClean="0"/>
-              <a:t> make a measurement, record the time, and send a Measurement Result object with all the relevant information to the Distributor.</a:t>
-            </a:r>
-          </a:p>
-          <a:p>
-            <a:r>
-              <a:rPr lang="en-GB" baseline="0" dirty="0" smtClean="0"/>
-              <a:t>In the starting case, I want to make it behave exactly like it does now!</a:t>
-            </a:r>
-          </a:p>
-          <a:p>
-            <a:r>
-              <a:rPr lang="en-GB" baseline="0" dirty="0" smtClean="0"/>
-              <a:t>First, we’ll get rid of the For loop in the middle – this is not relevant to the normal operation and is a lower level construct (like the error codes)</a:t>
-            </a:r>
-          </a:p>
-          <a:p>
-            <a:r>
-              <a:rPr lang="en-GB" baseline="0" dirty="0" smtClean="0"/>
-              <a:t>Work through in LabVIEW: start with MeasureTemperature_old.vi and try create a </a:t>
-            </a:r>
-            <a:r>
-              <a:rPr lang="en-GB" baseline="0" dirty="0" err="1" smtClean="0"/>
-              <a:t>subVI</a:t>
-            </a:r>
-            <a:r>
-              <a:rPr lang="en-GB" baseline="0" dirty="0" smtClean="0"/>
-              <a:t>. Note the large number of inputs, and how they’re all available via the class.</a:t>
-            </a:r>
-          </a:p>
-          <a:p>
+              <a:t>. The wiring diagram is immediately horrible…</a:t>
+            </a:r>
             <a:endParaRPr lang="en-GB" dirty="0"/>
           </a:p>
         </p:txBody>
@@ -922,7 +1687,7 @@
           <a:p>
             <a:fld id="{1964D22C-D060-4B91-BDE4-7001F6F6BDFB}" type="slidenum">
               <a:rPr lang="en-GB" smtClean="0"/>
-              <a:t>15</a:t>
+              <a:t>5</a:t>
             </a:fld>
             <a:endParaRPr lang="en-GB"/>
           </a:p>
@@ -931,7 +1696,7 @@
     </p:spTree>
     <p:extLst>
       <p:ext uri="{BB962C8B-B14F-4D97-AF65-F5344CB8AC3E}">
-        <p14:creationId xmlns:p14="http://schemas.microsoft.com/office/powerpoint/2010/main" val="3423329383"/>
+        <p14:creationId xmlns:p14="http://schemas.microsoft.com/office/powerpoint/2010/main" val="1976626827"/>
       </p:ext>
     </p:extLst>
   </p:cSld>
@@ -987,47 +1752,11 @@
           <a:p>
             <a:r>
               <a:rPr lang="en-GB" dirty="0" smtClean="0"/>
-              <a:t>Some of these are not</a:t>
+              <a:t>Here, handles unexpected messages, and disconnects</a:t>
             </a:r>
             <a:r>
               <a:rPr lang="en-GB" baseline="0" dirty="0" smtClean="0"/>
-              <a:t> inherently unreasonable – maybe directly coupling to the Error Handler is OK.</a:t>
-            </a:r>
-          </a:p>
-          <a:p>
-            <a:r>
-              <a:rPr lang="en-GB" baseline="0" dirty="0" smtClean="0"/>
-              <a:t>Some are ridiculous! How does LTC depend on a global VI in a different call chain, or </a:t>
-            </a:r>
-            <a:r>
-              <a:rPr lang="en-GB" baseline="0" dirty="0" err="1" smtClean="0"/>
-              <a:t>SimulatedData</a:t>
-            </a:r>
-            <a:r>
-              <a:rPr lang="en-GB" baseline="0" dirty="0" smtClean="0"/>
-              <a:t>/</a:t>
-            </a:r>
-            <a:r>
-              <a:rPr lang="en-GB" baseline="0" dirty="0" err="1" smtClean="0"/>
-              <a:t>CoolingUnitActor</a:t>
-            </a:r>
-            <a:r>
-              <a:rPr lang="en-GB" baseline="0" dirty="0" smtClean="0"/>
-              <a:t> (answer, probably a shared </a:t>
-            </a:r>
-            <a:r>
-              <a:rPr lang="en-GB" baseline="0" dirty="0" err="1" smtClean="0"/>
-              <a:t>typedef</a:t>
-            </a:r>
-            <a:r>
-              <a:rPr lang="en-GB" baseline="0" dirty="0" smtClean="0"/>
-              <a:t>!)</a:t>
-            </a:r>
-          </a:p>
-          <a:p>
-            <a:r>
-              <a:rPr lang="en-GB" baseline="0" dirty="0" smtClean="0"/>
-              <a:t>Reducing coupling will improve load times and improve chances of reuse elsewhere (example, a different experiment using the same hardware for this, but changing other parts).</a:t>
+              <a:t> on error. (Stop loop in bottom right)</a:t>
             </a:r>
             <a:endParaRPr lang="en-GB" dirty="0"/>
           </a:p>
@@ -1050,7 +1779,7 @@
           <a:p>
             <a:fld id="{1964D22C-D060-4B91-BDE4-7001F6F6BDFB}" type="slidenum">
               <a:rPr lang="en-GB" smtClean="0"/>
-              <a:t>16</a:t>
+              <a:t>6</a:t>
             </a:fld>
             <a:endParaRPr lang="en-GB"/>
           </a:p>
@@ -1059,7 +1788,7 @@
     </p:spTree>
     <p:extLst>
       <p:ext uri="{BB962C8B-B14F-4D97-AF65-F5344CB8AC3E}">
-        <p14:creationId xmlns:p14="http://schemas.microsoft.com/office/powerpoint/2010/main" val="554239013"/>
+        <p14:creationId xmlns:p14="http://schemas.microsoft.com/office/powerpoint/2010/main" val="3515237453"/>
       </p:ext>
     </p:extLst>
   </p:cSld>
@@ -1115,47 +1844,25 @@
           <a:p>
             <a:r>
               <a:rPr lang="en-GB" dirty="0" smtClean="0"/>
-              <a:t>Some of these are not</a:t>
+              <a:t>These are the remaining frames of the case structure. They</a:t>
             </a:r>
             <a:r>
               <a:rPr lang="en-GB" baseline="0" dirty="0" smtClean="0"/>
-              <a:t> inherently unreasonable – maybe directly coupling to the Error Handler is OK.</a:t>
-            </a:r>
-          </a:p>
-          <a:p>
+              <a:t> each take some of the inputs (only one uses all) and then call some </a:t>
+            </a:r>
+            <a:r>
+              <a:rPr lang="en-GB" baseline="0" dirty="0" err="1" smtClean="0"/>
+              <a:t>subVI</a:t>
+            </a:r>
             <a:r>
               <a:rPr lang="en-GB" baseline="0" dirty="0" smtClean="0"/>
-              <a:t>Some are ridiculous! How does LTC depend on a global VI in a different call chain, or </a:t>
-            </a:r>
-            <a:r>
-              <a:rPr lang="en-GB" baseline="0" dirty="0" err="1" smtClean="0"/>
-              <a:t>SimulatedData</a:t>
-            </a:r>
+              <a:t>.</a:t>
+            </a:r>
+          </a:p>
+          <a:p>
             <a:r>
               <a:rPr lang="en-GB" baseline="0" dirty="0" smtClean="0"/>
-              <a:t>/</a:t>
-            </a:r>
-            <a:r>
-              <a:rPr lang="en-GB" baseline="0" dirty="0" err="1" smtClean="0"/>
-              <a:t>CoolingUnitActor</a:t>
-            </a:r>
-            <a:r>
-              <a:rPr lang="en-GB" baseline="0" dirty="0" smtClean="0"/>
-              <a:t> (answer, probably a shared </a:t>
-            </a:r>
-            <a:r>
-              <a:rPr lang="en-GB" baseline="0" dirty="0" err="1" smtClean="0"/>
-              <a:t>typedef</a:t>
-            </a:r>
-            <a:r>
-              <a:rPr lang="en-GB" baseline="0" dirty="0" smtClean="0"/>
-              <a:t>!)</a:t>
-            </a:r>
-          </a:p>
-          <a:p>
-            <a:r>
-              <a:rPr lang="en-GB" baseline="0" dirty="0" smtClean="0"/>
-              <a:t>Reducing coupling will improve load times and improve chances of reuse elsewhere (example, a different experiment using the same hardware for this, but changing other parts).</a:t>
+              <a:t>The central VI is the one which reads the temperature, and which we will be looking at a wrapper for next.</a:t>
             </a:r>
             <a:endParaRPr lang="en-GB" dirty="0"/>
           </a:p>
@@ -1178,7 +1885,7 @@
           <a:p>
             <a:fld id="{1964D22C-D060-4B91-BDE4-7001F6F6BDFB}" type="slidenum">
               <a:rPr lang="en-GB" smtClean="0"/>
-              <a:t>17</a:t>
+              <a:t>7</a:t>
             </a:fld>
             <a:endParaRPr lang="en-GB"/>
           </a:p>
@@ -1187,7 +1894,322 @@
     </p:spTree>
     <p:extLst>
       <p:ext uri="{BB962C8B-B14F-4D97-AF65-F5344CB8AC3E}">
-        <p14:creationId xmlns:p14="http://schemas.microsoft.com/office/powerpoint/2010/main" val="3045378953"/>
+        <p14:creationId xmlns:p14="http://schemas.microsoft.com/office/powerpoint/2010/main" val="2232445158"/>
+      </p:ext>
+    </p:extLst>
+  </p:cSld>
+  <p:clrMapOvr>
+    <a:masterClrMapping/>
+  </p:clrMapOvr>
+</p:notes>
+</file>
+
+<file path=ppt/notesSlides/notesSlide7.xml><?xml version="1.0" encoding="utf-8"?>
+<p:notes xmlns:a="http://schemas.openxmlformats.org/drawingml/2006/main" xmlns:r="http://schemas.openxmlformats.org/officeDocument/2006/relationships" xmlns:p="http://schemas.openxmlformats.org/presentationml/2006/main">
+  <p:cSld>
+    <p:spTree>
+      <p:nvGrpSpPr>
+        <p:cNvPr id="1" name=""/>
+        <p:cNvGrpSpPr/>
+        <p:nvPr/>
+      </p:nvGrpSpPr>
+      <p:grpSpPr>
+        <a:xfrm>
+          <a:off x="0" y="0"/>
+          <a:ext cx="0" cy="0"/>
+          <a:chOff x="0" y="0"/>
+          <a:chExt cx="0" cy="0"/>
+        </a:xfrm>
+      </p:grpSpPr>
+      <p:sp>
+        <p:nvSpPr>
+          <p:cNvPr id="2" name="Slide Image Placeholder 1"/>
+          <p:cNvSpPr>
+            <a:spLocks noGrp="1" noRot="1" noChangeAspect="1"/>
+          </p:cNvSpPr>
+          <p:nvPr>
+            <p:ph type="sldImg"/>
+          </p:nvPr>
+        </p:nvSpPr>
+        <p:spPr/>
+      </p:sp>
+      <p:sp>
+        <p:nvSpPr>
+          <p:cNvPr id="3" name="Notes Placeholder 2"/>
+          <p:cNvSpPr>
+            <a:spLocks noGrp="1"/>
+          </p:cNvSpPr>
+          <p:nvPr>
+            <p:ph type="body" idx="1"/>
+          </p:nvPr>
+        </p:nvSpPr>
+        <p:spPr/>
+        <p:txBody>
+          <a:bodyPr/>
+          <a:lstStyle/>
+          <a:p>
+            <a:r>
+              <a:rPr lang="en-GB" dirty="0" smtClean="0"/>
+              <a:t>This class still has</a:t>
+            </a:r>
+            <a:r>
+              <a:rPr lang="en-GB" baseline="0" dirty="0" smtClean="0"/>
+              <a:t> all of the same data – which is really too much!</a:t>
+            </a:r>
+          </a:p>
+          <a:p>
+            <a:r>
+              <a:rPr lang="en-GB" baseline="0" dirty="0" smtClean="0"/>
+              <a:t>However, now it’s a little easier to pick out the items I need for a given </a:t>
+            </a:r>
+            <a:r>
+              <a:rPr lang="en-GB" baseline="0" dirty="0" err="1" smtClean="0"/>
+              <a:t>subVI</a:t>
+            </a:r>
+            <a:r>
+              <a:rPr lang="en-GB" baseline="0" dirty="0" smtClean="0"/>
+              <a:t>, and refactoring to reduce the spaghetti becomes more possible.</a:t>
+            </a:r>
+          </a:p>
+          <a:p>
+            <a:r>
+              <a:rPr lang="en-GB" baseline="0" dirty="0" smtClean="0"/>
+              <a:t>There are some additional data members (</a:t>
+            </a:r>
+            <a:r>
+              <a:rPr lang="en-GB" baseline="0" dirty="0" err="1" smtClean="0"/>
+              <a:t>Nreads</a:t>
+            </a:r>
+            <a:r>
+              <a:rPr lang="en-GB" baseline="0" dirty="0" smtClean="0"/>
+              <a:t>, Subpanel reference, Update Event, “Poll”) but the idea is similar.</a:t>
+            </a:r>
+            <a:endParaRPr lang="en-GB" dirty="0"/>
+          </a:p>
+        </p:txBody>
+      </p:sp>
+      <p:sp>
+        <p:nvSpPr>
+          <p:cNvPr id="4" name="Slide Number Placeholder 3"/>
+          <p:cNvSpPr>
+            <a:spLocks noGrp="1"/>
+          </p:cNvSpPr>
+          <p:nvPr>
+            <p:ph type="sldNum" sz="quarter" idx="10"/>
+          </p:nvPr>
+        </p:nvSpPr>
+        <p:spPr/>
+        <p:txBody>
+          <a:bodyPr/>
+          <a:lstStyle/>
+          <a:p>
+            <a:fld id="{1964D22C-D060-4B91-BDE4-7001F6F6BDFB}" type="slidenum">
+              <a:rPr lang="en-GB" smtClean="0"/>
+              <a:t>8</a:t>
+            </a:fld>
+            <a:endParaRPr lang="en-GB"/>
+          </a:p>
+        </p:txBody>
+      </p:sp>
+    </p:spTree>
+    <p:extLst>
+      <p:ext uri="{BB962C8B-B14F-4D97-AF65-F5344CB8AC3E}">
+        <p14:creationId xmlns:p14="http://schemas.microsoft.com/office/powerpoint/2010/main" val="2943700023"/>
+      </p:ext>
+    </p:extLst>
+  </p:cSld>
+  <p:clrMapOvr>
+    <a:masterClrMapping/>
+  </p:clrMapOvr>
+</p:notes>
+</file>
+
+<file path=ppt/notesSlides/notesSlide8.xml><?xml version="1.0" encoding="utf-8"?>
+<p:notes xmlns:a="http://schemas.openxmlformats.org/drawingml/2006/main" xmlns:r="http://schemas.openxmlformats.org/officeDocument/2006/relationships" xmlns:p="http://schemas.openxmlformats.org/presentationml/2006/main">
+  <p:cSld>
+    <p:spTree>
+      <p:nvGrpSpPr>
+        <p:cNvPr id="1" name=""/>
+        <p:cNvGrpSpPr/>
+        <p:nvPr/>
+      </p:nvGrpSpPr>
+      <p:grpSpPr>
+        <a:xfrm>
+          <a:off x="0" y="0"/>
+          <a:ext cx="0" cy="0"/>
+          <a:chOff x="0" y="0"/>
+          <a:chExt cx="0" cy="0"/>
+        </a:xfrm>
+      </p:grpSpPr>
+      <p:sp>
+        <p:nvSpPr>
+          <p:cNvPr id="2" name="Slide Image Placeholder 1"/>
+          <p:cNvSpPr>
+            <a:spLocks noGrp="1" noRot="1" noChangeAspect="1"/>
+          </p:cNvSpPr>
+          <p:nvPr>
+            <p:ph type="sldImg"/>
+          </p:nvPr>
+        </p:nvSpPr>
+        <p:spPr/>
+      </p:sp>
+      <p:sp>
+        <p:nvSpPr>
+          <p:cNvPr id="3" name="Notes Placeholder 2"/>
+          <p:cNvSpPr>
+            <a:spLocks noGrp="1"/>
+          </p:cNvSpPr>
+          <p:nvPr>
+            <p:ph type="body" idx="1"/>
+          </p:nvPr>
+        </p:nvSpPr>
+        <p:spPr/>
+        <p:txBody>
+          <a:bodyPr/>
+          <a:lstStyle/>
+          <a:p>
+            <a:r>
+              <a:rPr lang="en-GB" dirty="0" smtClean="0"/>
+              <a:t>This is where I’m going</a:t>
+            </a:r>
+            <a:r>
+              <a:rPr lang="en-GB" baseline="0" dirty="0" smtClean="0"/>
+              <a:t> to start this refactoring/rearranging – I have placed some of the “low-level” VIs inside these wrapping functions and I want to make them clearer so they can be more easily used with my Measurement interface.</a:t>
+            </a:r>
+          </a:p>
+          <a:p>
+            <a:r>
+              <a:rPr lang="en-GB" baseline="0" dirty="0" smtClean="0"/>
+              <a:t>Here, it looks like the important things are in the For loop, whilst really it never runs!</a:t>
+            </a:r>
+          </a:p>
+        </p:txBody>
+      </p:sp>
+      <p:sp>
+        <p:nvSpPr>
+          <p:cNvPr id="4" name="Slide Number Placeholder 3"/>
+          <p:cNvSpPr>
+            <a:spLocks noGrp="1"/>
+          </p:cNvSpPr>
+          <p:nvPr>
+            <p:ph type="sldNum" sz="quarter" idx="10"/>
+          </p:nvPr>
+        </p:nvSpPr>
+        <p:spPr/>
+        <p:txBody>
+          <a:bodyPr/>
+          <a:lstStyle/>
+          <a:p>
+            <a:fld id="{1964D22C-D060-4B91-BDE4-7001F6F6BDFB}" type="slidenum">
+              <a:rPr lang="en-GB" smtClean="0"/>
+              <a:t>9</a:t>
+            </a:fld>
+            <a:endParaRPr lang="en-GB"/>
+          </a:p>
+        </p:txBody>
+      </p:sp>
+    </p:spTree>
+    <p:extLst>
+      <p:ext uri="{BB962C8B-B14F-4D97-AF65-F5344CB8AC3E}">
+        <p14:creationId xmlns:p14="http://schemas.microsoft.com/office/powerpoint/2010/main" val="358415760"/>
+      </p:ext>
+    </p:extLst>
+  </p:cSld>
+  <p:clrMapOvr>
+    <a:masterClrMapping/>
+  </p:clrMapOvr>
+</p:notes>
+</file>
+
+<file path=ppt/notesSlides/notesSlide9.xml><?xml version="1.0" encoding="utf-8"?>
+<p:notes xmlns:a="http://schemas.openxmlformats.org/drawingml/2006/main" xmlns:r="http://schemas.openxmlformats.org/officeDocument/2006/relationships" xmlns:p="http://schemas.openxmlformats.org/presentationml/2006/main">
+  <p:cSld>
+    <p:spTree>
+      <p:nvGrpSpPr>
+        <p:cNvPr id="1" name=""/>
+        <p:cNvGrpSpPr/>
+        <p:nvPr/>
+      </p:nvGrpSpPr>
+      <p:grpSpPr>
+        <a:xfrm>
+          <a:off x="0" y="0"/>
+          <a:ext cx="0" cy="0"/>
+          <a:chOff x="0" y="0"/>
+          <a:chExt cx="0" cy="0"/>
+        </a:xfrm>
+      </p:grpSpPr>
+      <p:sp>
+        <p:nvSpPr>
+          <p:cNvPr id="2" name="Slide Image Placeholder 1"/>
+          <p:cNvSpPr>
+            <a:spLocks noGrp="1" noRot="1" noChangeAspect="1"/>
+          </p:cNvSpPr>
+          <p:nvPr>
+            <p:ph type="sldImg"/>
+          </p:nvPr>
+        </p:nvSpPr>
+        <p:spPr/>
+      </p:sp>
+      <p:sp>
+        <p:nvSpPr>
+          <p:cNvPr id="3" name="Notes Placeholder 2"/>
+          <p:cNvSpPr>
+            <a:spLocks noGrp="1"/>
+          </p:cNvSpPr>
+          <p:nvPr>
+            <p:ph type="body" idx="1"/>
+          </p:nvPr>
+        </p:nvSpPr>
+        <p:spPr/>
+        <p:txBody>
+          <a:bodyPr/>
+          <a:lstStyle/>
+          <a:p>
+            <a:r>
+              <a:rPr lang="en-GB" dirty="0" smtClean="0"/>
+              <a:t>This is an example that can be made because of</a:t>
+            </a:r>
+            <a:r>
+              <a:rPr lang="en-GB" baseline="0" dirty="0" smtClean="0"/>
+              <a:t> the Results hierarchy we’ve previously discussed – all of my Measurements can create Results objects, which can then be passed to a Distributor</a:t>
+            </a:r>
+          </a:p>
+          <a:p>
+            <a:r>
+              <a:rPr lang="en-GB" baseline="0" dirty="0" smtClean="0"/>
+              <a:t>By being able to independently vary the Distributor, I can control how data is passed in the system (without introducing additional dependencies to the Measurements – they depend only on the interface class, which does nothing).</a:t>
+            </a:r>
+            <a:endParaRPr lang="en-GB" dirty="0"/>
+          </a:p>
+        </p:txBody>
+      </p:sp>
+      <p:sp>
+        <p:nvSpPr>
+          <p:cNvPr id="4" name="Slide Number Placeholder 3"/>
+          <p:cNvSpPr>
+            <a:spLocks noGrp="1"/>
+          </p:cNvSpPr>
+          <p:nvPr>
+            <p:ph type="sldNum" sz="quarter" idx="10"/>
+          </p:nvPr>
+        </p:nvSpPr>
+        <p:spPr/>
+        <p:txBody>
+          <a:bodyPr/>
+          <a:lstStyle/>
+          <a:p>
+            <a:fld id="{1964D22C-D060-4B91-BDE4-7001F6F6BDFB}" type="slidenum">
+              <a:rPr lang="en-GB" smtClean="0"/>
+              <a:t>10</a:t>
+            </a:fld>
+            <a:endParaRPr lang="en-GB"/>
+          </a:p>
+        </p:txBody>
+      </p:sp>
+    </p:spTree>
+    <p:extLst>
+      <p:ext uri="{BB962C8B-B14F-4D97-AF65-F5344CB8AC3E}">
+        <p14:creationId xmlns:p14="http://schemas.microsoft.com/office/powerpoint/2010/main" val="496495726"/>
       </p:ext>
     </p:extLst>
   </p:cSld>
@@ -1328,7 +2350,7 @@
           <a:p>
             <a:fld id="{7E8ED1FB-AF9E-4725-9EA9-57277AEEEA15}" type="datetimeFigureOut">
               <a:rPr lang="en-GB" smtClean="0"/>
-              <a:t>22/11/2017</a:t>
+              <a:t>23/11/2017</a:t>
             </a:fld>
             <a:endParaRPr lang="en-GB"/>
           </a:p>
@@ -1498,7 +2520,7 @@
           <a:p>
             <a:fld id="{7E8ED1FB-AF9E-4725-9EA9-57277AEEEA15}" type="datetimeFigureOut">
               <a:rPr lang="en-GB" smtClean="0"/>
-              <a:t>22/11/2017</a:t>
+              <a:t>23/11/2017</a:t>
             </a:fld>
             <a:endParaRPr lang="en-GB"/>
           </a:p>
@@ -1678,7 +2700,7 @@
           <a:p>
             <a:fld id="{7E8ED1FB-AF9E-4725-9EA9-57277AEEEA15}" type="datetimeFigureOut">
               <a:rPr lang="en-GB" smtClean="0"/>
-              <a:t>22/11/2017</a:t>
+              <a:t>23/11/2017</a:t>
             </a:fld>
             <a:endParaRPr lang="en-GB"/>
           </a:p>
@@ -1848,7 +2870,7 @@
           <a:p>
             <a:fld id="{7E8ED1FB-AF9E-4725-9EA9-57277AEEEA15}" type="datetimeFigureOut">
               <a:rPr lang="en-GB" smtClean="0"/>
-              <a:t>22/11/2017</a:t>
+              <a:t>23/11/2017</a:t>
             </a:fld>
             <a:endParaRPr lang="en-GB"/>
           </a:p>
@@ -2094,7 +3116,7 @@
           <a:p>
             <a:fld id="{7E8ED1FB-AF9E-4725-9EA9-57277AEEEA15}" type="datetimeFigureOut">
               <a:rPr lang="en-GB" smtClean="0"/>
-              <a:t>22/11/2017</a:t>
+              <a:t>23/11/2017</a:t>
             </a:fld>
             <a:endParaRPr lang="en-GB"/>
           </a:p>
@@ -2326,7 +3348,7 @@
           <a:p>
             <a:fld id="{7E8ED1FB-AF9E-4725-9EA9-57277AEEEA15}" type="datetimeFigureOut">
               <a:rPr lang="en-GB" smtClean="0"/>
-              <a:t>22/11/2017</a:t>
+              <a:t>23/11/2017</a:t>
             </a:fld>
             <a:endParaRPr lang="en-GB"/>
           </a:p>
@@ -2693,7 +3715,7 @@
           <a:p>
             <a:fld id="{7E8ED1FB-AF9E-4725-9EA9-57277AEEEA15}" type="datetimeFigureOut">
               <a:rPr lang="en-GB" smtClean="0"/>
-              <a:t>22/11/2017</a:t>
+              <a:t>23/11/2017</a:t>
             </a:fld>
             <a:endParaRPr lang="en-GB"/>
           </a:p>
@@ -2811,7 +3833,7 @@
           <a:p>
             <a:fld id="{7E8ED1FB-AF9E-4725-9EA9-57277AEEEA15}" type="datetimeFigureOut">
               <a:rPr lang="en-GB" smtClean="0"/>
-              <a:t>22/11/2017</a:t>
+              <a:t>23/11/2017</a:t>
             </a:fld>
             <a:endParaRPr lang="en-GB"/>
           </a:p>
@@ -2906,7 +3928,7 @@
           <a:p>
             <a:fld id="{7E8ED1FB-AF9E-4725-9EA9-57277AEEEA15}" type="datetimeFigureOut">
               <a:rPr lang="en-GB" smtClean="0"/>
-              <a:t>22/11/2017</a:t>
+              <a:t>23/11/2017</a:t>
             </a:fld>
             <a:endParaRPr lang="en-GB"/>
           </a:p>
@@ -3183,7 +4205,7 @@
           <a:p>
             <a:fld id="{7E8ED1FB-AF9E-4725-9EA9-57277AEEEA15}" type="datetimeFigureOut">
               <a:rPr lang="en-GB" smtClean="0"/>
-              <a:t>22/11/2017</a:t>
+              <a:t>23/11/2017</a:t>
             </a:fld>
             <a:endParaRPr lang="en-GB"/>
           </a:p>
@@ -3436,7 +4458,7 @@
           <a:p>
             <a:fld id="{7E8ED1FB-AF9E-4725-9EA9-57277AEEEA15}" type="datetimeFigureOut">
               <a:rPr lang="en-GB" smtClean="0"/>
-              <a:t>22/11/2017</a:t>
+              <a:t>23/11/2017</a:t>
             </a:fld>
             <a:endParaRPr lang="en-GB"/>
           </a:p>
@@ -3649,7 +4671,7 @@
           <a:p>
             <a:fld id="{7E8ED1FB-AF9E-4725-9EA9-57277AEEEA15}" type="datetimeFigureOut">
               <a:rPr lang="en-GB" smtClean="0"/>
-              <a:t>22/11/2017</a:t>
+              <a:t>23/11/2017</a:t>
             </a:fld>
             <a:endParaRPr lang="en-GB"/>
           </a:p>
@@ -4216,7 +5238,7 @@
           <p:nvPr/>
         </p:nvPicPr>
         <p:blipFill>
-          <a:blip r:embed="rId2">
+          <a:blip r:embed="rId3">
             <a:extLst>
               <a:ext uri="{28A0092B-C50C-407E-A947-70E740481C1C}">
                 <a14:useLocalDpi xmlns:a14="http://schemas.microsoft.com/office/drawing/2010/main" val="0"/>
@@ -4246,7 +5268,7 @@
           <p:nvPr/>
         </p:nvPicPr>
         <p:blipFill>
-          <a:blip r:embed="rId3">
+          <a:blip r:embed="rId4">
             <a:extLst>
               <a:ext uri="{28A0092B-C50C-407E-A947-70E740481C1C}">
                 <a14:useLocalDpi xmlns:a14="http://schemas.microsoft.com/office/drawing/2010/main" val="0"/>
@@ -4277,6 +5299,13 @@
   <p:clrMapOvr>
     <a:masterClrMapping/>
   </p:clrMapOvr>
+  <p:timing>
+    <p:tnLst>
+      <p:par>
+        <p:cTn id="1" dur="indefinite" restart="never" nodeType="tmRoot"/>
+      </p:par>
+    </p:tnLst>
+  </p:timing>
 </p:sld>
 </file>
 
@@ -4622,7 +5651,7 @@
           <p:nvPr/>
         </p:nvPicPr>
         <p:blipFill>
-          <a:blip r:embed="rId2">
+          <a:blip r:embed="rId3">
             <a:extLst>
               <a:ext uri="{28A0092B-C50C-407E-A947-70E740481C1C}">
                 <a14:useLocalDpi xmlns:a14="http://schemas.microsoft.com/office/drawing/2010/main" val="0"/>
@@ -4653,6 +5682,13 @@
   <p:clrMapOvr>
     <a:masterClrMapping/>
   </p:clrMapOvr>
+  <p:timing>
+    <p:tnLst>
+      <p:par>
+        <p:cTn id="1" dur="indefinite" restart="never" nodeType="tmRoot"/>
+      </p:par>
+    </p:tnLst>
+  </p:timing>
 </p:sld>
 </file>
 
@@ -4741,6 +5777,13 @@
   <p:clrMapOvr>
     <a:masterClrMapping/>
   </p:clrMapOvr>
+  <p:timing>
+    <p:tnLst>
+      <p:par>
+        <p:cTn id="1" dur="indefinite" restart="never" nodeType="tmRoot"/>
+      </p:par>
+    </p:tnLst>
+  </p:timing>
 </p:sld>
 </file>
 
@@ -5498,6 +6541,134 @@
 </p:sld>
 </file>
 
+<file path=ppt/slides/slide18.xml><?xml version="1.0" encoding="utf-8"?>
+<p:sld xmlns:a="http://schemas.openxmlformats.org/drawingml/2006/main" xmlns:r="http://schemas.openxmlformats.org/officeDocument/2006/relationships" xmlns:p="http://schemas.openxmlformats.org/presentationml/2006/main">
+  <p:cSld>
+    <p:spTree>
+      <p:nvGrpSpPr>
+        <p:cNvPr id="1" name=""/>
+        <p:cNvGrpSpPr/>
+        <p:nvPr/>
+      </p:nvGrpSpPr>
+      <p:grpSpPr>
+        <a:xfrm>
+          <a:off x="0" y="0"/>
+          <a:ext cx="0" cy="0"/>
+          <a:chOff x="0" y="0"/>
+          <a:chExt cx="0" cy="0"/>
+        </a:xfrm>
+      </p:grpSpPr>
+      <p:sp>
+        <p:nvSpPr>
+          <p:cNvPr id="2" name="Title 1"/>
+          <p:cNvSpPr>
+            <a:spLocks noGrp="1"/>
+          </p:cNvSpPr>
+          <p:nvPr>
+            <p:ph type="title"/>
+          </p:nvPr>
+        </p:nvSpPr>
+        <p:spPr/>
+        <p:txBody>
+          <a:bodyPr/>
+          <a:lstStyle/>
+          <a:p>
+            <a:r>
+              <a:rPr lang="en-GB" dirty="0" smtClean="0"/>
+              <a:t>Adding a child allows simple testing!</a:t>
+            </a:r>
+            <a:endParaRPr lang="en-GB" dirty="0"/>
+          </a:p>
+        </p:txBody>
+      </p:sp>
+      <p:sp>
+        <p:nvSpPr>
+          <p:cNvPr id="3" name="Content Placeholder 2"/>
+          <p:cNvSpPr>
+            <a:spLocks noGrp="1"/>
+          </p:cNvSpPr>
+          <p:nvPr>
+            <p:ph idx="1"/>
+          </p:nvPr>
+        </p:nvSpPr>
+        <p:spPr>
+          <a:xfrm>
+            <a:off x="838200" y="1794094"/>
+            <a:ext cx="4133193" cy="4351338"/>
+          </a:xfrm>
+        </p:spPr>
+        <p:txBody>
+          <a:bodyPr/>
+          <a:lstStyle/>
+          <a:p>
+            <a:r>
+              <a:rPr lang="en-GB" dirty="0" smtClean="0"/>
+              <a:t>Finally, we can now add a child, override just one method, and have a ‘working’ test</a:t>
+            </a:r>
+            <a:endParaRPr lang="en-GB" dirty="0"/>
+          </a:p>
+        </p:txBody>
+      </p:sp>
+      <p:sp>
+        <p:nvSpPr>
+          <p:cNvPr id="4" name="Smiley Face 3"/>
+          <p:cNvSpPr/>
+          <p:nvPr/>
+        </p:nvSpPr>
+        <p:spPr>
+          <a:xfrm>
+            <a:off x="5812221" y="2017986"/>
+            <a:ext cx="4214648" cy="3636579"/>
+          </a:xfrm>
+          <a:prstGeom prst="smileyFace">
+            <a:avLst/>
+          </a:prstGeom>
+        </p:spPr>
+        <p:style>
+          <a:lnRef idx="2">
+            <a:schemeClr val="accent1">
+              <a:shade val="50000"/>
+            </a:schemeClr>
+          </a:lnRef>
+          <a:fillRef idx="1">
+            <a:schemeClr val="accent1"/>
+          </a:fillRef>
+          <a:effectRef idx="0">
+            <a:schemeClr val="accent1"/>
+          </a:effectRef>
+          <a:fontRef idx="minor">
+            <a:schemeClr val="lt1"/>
+          </a:fontRef>
+        </p:style>
+        <p:txBody>
+          <a:bodyPr rtlCol="0" anchor="ctr"/>
+          <a:lstStyle/>
+          <a:p>
+            <a:pPr algn="ctr"/>
+            <a:endParaRPr lang="en-GB"/>
+          </a:p>
+        </p:txBody>
+      </p:sp>
+    </p:spTree>
+    <p:extLst>
+      <p:ext uri="{BB962C8B-B14F-4D97-AF65-F5344CB8AC3E}">
+        <p14:creationId xmlns:p14="http://schemas.microsoft.com/office/powerpoint/2010/main" val="510092040"/>
+      </p:ext>
+    </p:extLst>
+  </p:cSld>
+  <p:clrMapOvr>
+    <a:masterClrMapping/>
+  </p:clrMapOvr>
+  <p:timing>
+    <p:tnLst>
+      <p:par>
+        <p:cTn id="1" dur="indefinite" restart="never" nodeType="tmRoot"/>
+      </p:par>
+    </p:tnLst>
+  </p:timing>
+</p:sld>
+</file>
+
 <file path=ppt/slides/slide2.xml><?xml version="1.0" encoding="utf-8"?>
 <p:sld xmlns:a="http://schemas.openxmlformats.org/drawingml/2006/main" xmlns:r="http://schemas.openxmlformats.org/officeDocument/2006/relationships" xmlns:p="http://schemas.openxmlformats.org/presentationml/2006/main">
   <p:cSld>
@@ -5549,7 +6720,7 @@
           </p:nvPr>
         </p:nvPicPr>
         <p:blipFill>
-          <a:blip r:embed="rId2">
+          <a:blip r:embed="rId3">
             <a:extLst>
               <a:ext uri="{28A0092B-C50C-407E-A947-70E740481C1C}">
                 <a14:useLocalDpi xmlns:a14="http://schemas.microsoft.com/office/drawing/2010/main" val="0"/>
@@ -5576,7 +6747,7 @@
           <p:nvPr/>
         </p:nvPicPr>
         <p:blipFill>
-          <a:blip r:embed="rId3">
+          <a:blip r:embed="rId4">
             <a:extLst>
               <a:ext uri="{28A0092B-C50C-407E-A947-70E740481C1C}">
                 <a14:useLocalDpi xmlns:a14="http://schemas.microsoft.com/office/drawing/2010/main" val="0"/>
@@ -5638,7 +6809,7 @@
           </p:nvPr>
         </p:nvPicPr>
         <p:blipFill>
-          <a:blip r:embed="rId2">
+          <a:blip r:embed="rId3">
             <a:extLst>
               <a:ext uri="{28A0092B-C50C-407E-A947-70E740481C1C}">
                 <a14:useLocalDpi xmlns:a14="http://schemas.microsoft.com/office/drawing/2010/main" val="0"/>
@@ -5665,7 +6836,7 @@
           <p:nvPr/>
         </p:nvPicPr>
         <p:blipFill>
-          <a:blip r:embed="rId3">
+          <a:blip r:embed="rId4">
             <a:extLst>
               <a:ext uri="{28A0092B-C50C-407E-A947-70E740481C1C}">
                 <a14:useLocalDpi xmlns:a14="http://schemas.microsoft.com/office/drawing/2010/main" val="0"/>
@@ -5695,7 +6866,7 @@
           <p:nvPr/>
         </p:nvPicPr>
         <p:blipFill>
-          <a:blip r:embed="rId4">
+          <a:blip r:embed="rId5">
             <a:extLst>
               <a:ext uri="{28A0092B-C50C-407E-A947-70E740481C1C}">
                 <a14:useLocalDpi xmlns:a14="http://schemas.microsoft.com/office/drawing/2010/main" val="0"/>
@@ -5725,7 +6896,7 @@
           <p:nvPr/>
         </p:nvPicPr>
         <p:blipFill>
-          <a:blip r:embed="rId5">
+          <a:blip r:embed="rId6">
             <a:extLst>
               <a:ext uri="{28A0092B-C50C-407E-A947-70E740481C1C}">
                 <a14:useLocalDpi xmlns:a14="http://schemas.microsoft.com/office/drawing/2010/main" val="0"/>
@@ -5787,7 +6958,7 @@
           </p:nvPr>
         </p:nvPicPr>
         <p:blipFill>
-          <a:blip r:embed="rId2" cstate="print">
+          <a:blip r:embed="rId3" cstate="print">
             <a:extLst>
               <a:ext uri="{28A0092B-C50C-407E-A947-70E740481C1C}">
                 <a14:useLocalDpi xmlns:a14="http://schemas.microsoft.com/office/drawing/2010/main" val="0"/>
@@ -5846,7 +7017,7 @@
           </p:nvPr>
         </p:nvPicPr>
         <p:blipFill>
-          <a:blip r:embed="rId2">
+          <a:blip r:embed="rId3">
             <a:extLst>
               <a:ext uri="{28A0092B-C50C-407E-A947-70E740481C1C}">
                 <a14:useLocalDpi xmlns:a14="http://schemas.microsoft.com/office/drawing/2010/main" val="0"/>
@@ -5873,7 +7044,7 @@
           <p:nvPr/>
         </p:nvPicPr>
         <p:blipFill>
-          <a:blip r:embed="rId3">
+          <a:blip r:embed="rId4">
             <a:extLst>
               <a:ext uri="{28A0092B-C50C-407E-A947-70E740481C1C}">
                 <a14:useLocalDpi xmlns:a14="http://schemas.microsoft.com/office/drawing/2010/main" val="0"/>
@@ -5933,7 +7104,7 @@
           <p:nvPr/>
         </p:nvPicPr>
         <p:blipFill>
-          <a:blip r:embed="rId2">
+          <a:blip r:embed="rId3">
             <a:extLst>
               <a:ext uri="{28A0092B-C50C-407E-A947-70E740481C1C}">
                 <a14:useLocalDpi xmlns:a14="http://schemas.microsoft.com/office/drawing/2010/main" val="0"/>
@@ -5963,7 +7134,7 @@
           <p:nvPr/>
         </p:nvPicPr>
         <p:blipFill>
-          <a:blip r:embed="rId3">
+          <a:blip r:embed="rId4">
             <a:extLst>
               <a:ext uri="{28A0092B-C50C-407E-A947-70E740481C1C}">
                 <a14:useLocalDpi xmlns:a14="http://schemas.microsoft.com/office/drawing/2010/main" val="0"/>
@@ -5993,7 +7164,7 @@
           <p:nvPr/>
         </p:nvPicPr>
         <p:blipFill>
-          <a:blip r:embed="rId4">
+          <a:blip r:embed="rId5">
             <a:extLst>
               <a:ext uri="{28A0092B-C50C-407E-A947-70E740481C1C}">
                 <a14:useLocalDpi xmlns:a14="http://schemas.microsoft.com/office/drawing/2010/main" val="0"/>
@@ -6053,7 +7224,7 @@
           <p:nvPr/>
         </p:nvPicPr>
         <p:blipFill>
-          <a:blip r:embed="rId2">
+          <a:blip r:embed="rId3">
             <a:extLst>
               <a:ext uri="{28A0092B-C50C-407E-A947-70E740481C1C}">
                 <a14:useLocalDpi xmlns:a14="http://schemas.microsoft.com/office/drawing/2010/main" val="0"/>
@@ -6083,7 +7254,7 @@
           <p:nvPr/>
         </p:nvPicPr>
         <p:blipFill>
-          <a:blip r:embed="rId3">
+          <a:blip r:embed="rId4">
             <a:extLst>
               <a:ext uri="{28A0092B-C50C-407E-A947-70E740481C1C}">
                 <a14:useLocalDpi xmlns:a14="http://schemas.microsoft.com/office/drawing/2010/main" val="0"/>
@@ -6113,7 +7284,7 @@
           <p:nvPr/>
         </p:nvPicPr>
         <p:blipFill>
-          <a:blip r:embed="rId4">
+          <a:blip r:embed="rId5">
             <a:extLst>
               <a:ext uri="{28A0092B-C50C-407E-A947-70E740481C1C}">
                 <a14:useLocalDpi xmlns:a14="http://schemas.microsoft.com/office/drawing/2010/main" val="0"/>
@@ -6143,7 +7314,7 @@
           <p:nvPr/>
         </p:nvPicPr>
         <p:blipFill>
-          <a:blip r:embed="rId5">
+          <a:blip r:embed="rId6">
             <a:extLst>
               <a:ext uri="{28A0092B-C50C-407E-A947-70E740481C1C}">
                 <a14:useLocalDpi xmlns:a14="http://schemas.microsoft.com/office/drawing/2010/main" val="0"/>
@@ -6173,7 +7344,7 @@
           <p:nvPr/>
         </p:nvPicPr>
         <p:blipFill>
-          <a:blip r:embed="rId6">
+          <a:blip r:embed="rId7">
             <a:extLst>
               <a:ext uri="{28A0092B-C50C-407E-A947-70E740481C1C}">
                 <a14:useLocalDpi xmlns:a14="http://schemas.microsoft.com/office/drawing/2010/main" val="0"/>
@@ -6258,7 +7429,7 @@
           </p:nvPr>
         </p:nvPicPr>
         <p:blipFill>
-          <a:blip r:embed="rId2">
+          <a:blip r:embed="rId3">
             <a:extLst>
               <a:ext uri="{28A0092B-C50C-407E-A947-70E740481C1C}">
                 <a14:useLocalDpi xmlns:a14="http://schemas.microsoft.com/office/drawing/2010/main" val="0"/>
@@ -6401,7 +7572,7 @@
           </p:nvPr>
         </p:nvPicPr>
         <p:blipFill>
-          <a:blip r:embed="rId2">
+          <a:blip r:embed="rId3">
             <a:extLst>
               <a:ext uri="{28A0092B-C50C-407E-A947-70E740481C1C}">
                 <a14:useLocalDpi xmlns:a14="http://schemas.microsoft.com/office/drawing/2010/main" val="0"/>
@@ -6414,9 +7585,39 @@
         </p:blipFill>
         <p:spPr>
           <a:xfrm>
-            <a:off x="1081314" y="1346653"/>
+            <a:off x="1828566" y="1346653"/>
             <a:ext cx="10029371" cy="5112585"/>
           </a:xfrm>
+        </p:spPr>
+      </p:pic>
+      <p:pic>
+        <p:nvPicPr>
+          <p:cNvPr id="6" name="Picture 5"/>
+          <p:cNvPicPr>
+            <a:picLocks noChangeAspect="1"/>
+          </p:cNvPicPr>
+          <p:nvPr/>
+        </p:nvPicPr>
+        <p:blipFill>
+          <a:blip r:embed="rId4">
+            <a:extLst>
+              <a:ext uri="{28A0092B-C50C-407E-A947-70E740481C1C}">
+                <a14:useLocalDpi xmlns:a14="http://schemas.microsoft.com/office/drawing/2010/main" val="0"/>
+              </a:ext>
+            </a:extLst>
+          </a:blip>
+          <a:stretch>
+            <a:fillRect/>
+          </a:stretch>
+        </p:blipFill>
+        <p:spPr>
+          <a:xfrm>
+            <a:off x="588421" y="3613411"/>
+            <a:ext cx="2705384" cy="2845827"/>
+          </a:xfrm>
+          <a:prstGeom prst="rect">
+            <a:avLst/>
+          </a:prstGeom>
         </p:spPr>
       </p:pic>
     </p:spTree>
@@ -6429,6 +7630,81 @@
   <p:clrMapOvr>
     <a:masterClrMapping/>
   </p:clrMapOvr>
+  <p:timing>
+    <p:tnLst>
+      <p:par>
+        <p:cTn id="1" dur="indefinite" restart="never" nodeType="tmRoot">
+          <p:childTnLst>
+            <p:seq concurrent="1" nextAc="seek">
+              <p:cTn id="2" dur="indefinite" nodeType="mainSeq">
+                <p:childTnLst>
+                  <p:par>
+                    <p:cTn id="3" fill="hold">
+                      <p:stCondLst>
+                        <p:cond delay="indefinite"/>
+                      </p:stCondLst>
+                      <p:childTnLst>
+                        <p:par>
+                          <p:cTn id="4" fill="hold">
+                            <p:stCondLst>
+                              <p:cond delay="0"/>
+                            </p:stCondLst>
+                            <p:childTnLst>
+                              <p:par>
+                                <p:cTn id="5" presetID="1" presetClass="entr" presetSubtype="0" fill="hold" nodeType="clickEffect">
+                                  <p:stCondLst>
+                                    <p:cond delay="0"/>
+                                  </p:stCondLst>
+                                  <p:childTnLst>
+                                    <p:set>
+                                      <p:cBhvr>
+                                        <p:cTn id="6" dur="1" fill="hold">
+                                          <p:stCondLst>
+                                            <p:cond delay="0"/>
+                                          </p:stCondLst>
+                                        </p:cTn>
+                                        <p:tgtEl>
+                                          <p:spTgt spid="6"/>
+                                        </p:tgtEl>
+                                        <p:attrNameLst>
+                                          <p:attrName>style.visibility</p:attrName>
+                                        </p:attrNameLst>
+                                      </p:cBhvr>
+                                      <p:to>
+                                        <p:strVal val="visible"/>
+                                      </p:to>
+                                    </p:set>
+                                  </p:childTnLst>
+                                </p:cTn>
+                              </p:par>
+                            </p:childTnLst>
+                          </p:cTn>
+                        </p:par>
+                      </p:childTnLst>
+                    </p:cTn>
+                  </p:par>
+                </p:childTnLst>
+              </p:cTn>
+              <p:prevCondLst>
+                <p:cond evt="onPrev" delay="0">
+                  <p:tgtEl>
+                    <p:sldTgt/>
+                  </p:tgtEl>
+                </p:cond>
+              </p:prevCondLst>
+              <p:nextCondLst>
+                <p:cond evt="onNext" delay="0">
+                  <p:tgtEl>
+                    <p:sldTgt/>
+                  </p:tgtEl>
+                </p:cond>
+              </p:nextCondLst>
+            </p:seq>
+          </p:childTnLst>
+        </p:cTn>
+      </p:par>
+    </p:tnLst>
+  </p:timing>
 </p:sld>
 </file>
 

</xml_diff>